<commit_message>
PPT fil ændring (mindre)
</commit_message>
<xml_diff>
--- a/forlob6_database/Intro til databaser DDU 24_25.pptx
+++ b/forlob6_database/Intro til databaser DDU 24_25.pptx
@@ -4761,7 +4761,7 @@
             </a:r>
             <a:r>
               <a:rPr lang="da-DK" sz="2400" dirty="0"/>
-              <a:t>” eller ”DB Browser” eller MySQL server. 			Sætte en simpel database op, prøve simple SQL og evt. PHP kommandoer 			af, se film omkring ER 	diagram evt. prøv det af</a:t>
+              <a:t>” eller ”DB Browser” eller MySQL server. 			Sætte en simpel database op, prøve simple SQL og evt. PHP kommandoer 			af, evt. se film omkring ER diagram og prøv det af</a:t>
             </a:r>
             <a:br>
               <a:rPr lang="da-DK" sz="2400" dirty="0"/>
@@ -4779,7 +4779,7 @@
             </a:r>
             <a:r>
               <a:rPr lang="da-DK" sz="2400" dirty="0"/>
-              <a:t> Forsætte med at forstå SQL og databaser samt prøve simple 			(udleverede) </a:t>
+              <a:t> Fortsætte med at forstå SQL og databaser samt prøve simple 			(udleverede) </a:t>
             </a:r>
             <a:r>
               <a:rPr lang="da-DK" sz="2400" dirty="0" err="1"/>
@@ -4787,7 +4787,7 @@
             </a:r>
             <a:r>
               <a:rPr lang="da-DK" sz="2400" dirty="0"/>
-              <a:t> programmer af imod databasen og få data frem og 			tilbage vha. simple SQL kommandoer. Fortsæt med ER diagrammer.</a:t>
+              <a:t> programmer af imod databasen og få data frem og 			tilbage vha. simple SQL kommandoer. Fortsæt evt. med ER diagrammer.</a:t>
             </a:r>
             <a:br>
               <a:rPr lang="da-DK" sz="2400" dirty="0"/>
@@ -5133,7 +5133,12 @@
             <p:ph type="title"/>
           </p:nvPr>
         </p:nvSpPr>
-        <p:spPr/>
+        <p:spPr>
+          <a:xfrm>
+            <a:off x="411480" y="222885"/>
+            <a:ext cx="10515600" cy="1325563"/>
+          </a:xfrm>
+        </p:spPr>
         <p:txBody>
           <a:bodyPr/>
           <a:lstStyle/>

</xml_diff>

<commit_message>
Powerpoint ændring og tilføjelse
</commit_message>
<xml_diff>
--- a/forlob6_database/Intro til databaser DDU 24_25.pptx
+++ b/forlob6_database/Intro til databaser DDU 24_25.pptx
@@ -258,7 +258,7 @@
           <a:p>
             <a:fld id="{932F90C7-F235-4F56-A8D8-8F315B19907E}" type="datetimeFigureOut">
               <a:rPr lang="da-DK" smtClean="0"/>
-              <a:t>13-10-2024</a:t>
+              <a:t>21-10-2024</a:t>
             </a:fld>
             <a:endParaRPr lang="da-DK"/>
           </a:p>
@@ -426,7 +426,7 @@
           <a:p>
             <a:fld id="{932F90C7-F235-4F56-A8D8-8F315B19907E}" type="datetimeFigureOut">
               <a:rPr lang="da-DK" smtClean="0"/>
-              <a:t>13-10-2024</a:t>
+              <a:t>21-10-2024</a:t>
             </a:fld>
             <a:endParaRPr lang="da-DK"/>
           </a:p>
@@ -604,7 +604,7 @@
           <a:p>
             <a:fld id="{932F90C7-F235-4F56-A8D8-8F315B19907E}" type="datetimeFigureOut">
               <a:rPr lang="da-DK" smtClean="0"/>
-              <a:t>13-10-2024</a:t>
+              <a:t>21-10-2024</a:t>
             </a:fld>
             <a:endParaRPr lang="da-DK"/>
           </a:p>
@@ -772,7 +772,7 @@
           <a:p>
             <a:fld id="{932F90C7-F235-4F56-A8D8-8F315B19907E}" type="datetimeFigureOut">
               <a:rPr lang="da-DK" smtClean="0"/>
-              <a:t>13-10-2024</a:t>
+              <a:t>21-10-2024</a:t>
             </a:fld>
             <a:endParaRPr lang="da-DK"/>
           </a:p>
@@ -1017,7 +1017,7 @@
           <a:p>
             <a:fld id="{932F90C7-F235-4F56-A8D8-8F315B19907E}" type="datetimeFigureOut">
               <a:rPr lang="da-DK" smtClean="0"/>
-              <a:t>13-10-2024</a:t>
+              <a:t>21-10-2024</a:t>
             </a:fld>
             <a:endParaRPr lang="da-DK"/>
           </a:p>
@@ -1246,7 +1246,7 @@
           <a:p>
             <a:fld id="{932F90C7-F235-4F56-A8D8-8F315B19907E}" type="datetimeFigureOut">
               <a:rPr lang="da-DK" smtClean="0"/>
-              <a:t>13-10-2024</a:t>
+              <a:t>21-10-2024</a:t>
             </a:fld>
             <a:endParaRPr lang="da-DK"/>
           </a:p>
@@ -1610,7 +1610,7 @@
           <a:p>
             <a:fld id="{932F90C7-F235-4F56-A8D8-8F315B19907E}" type="datetimeFigureOut">
               <a:rPr lang="da-DK" smtClean="0"/>
-              <a:t>13-10-2024</a:t>
+              <a:t>21-10-2024</a:t>
             </a:fld>
             <a:endParaRPr lang="da-DK"/>
           </a:p>
@@ -1727,7 +1727,7 @@
           <a:p>
             <a:fld id="{932F90C7-F235-4F56-A8D8-8F315B19907E}" type="datetimeFigureOut">
               <a:rPr lang="da-DK" smtClean="0"/>
-              <a:t>13-10-2024</a:t>
+              <a:t>21-10-2024</a:t>
             </a:fld>
             <a:endParaRPr lang="da-DK"/>
           </a:p>
@@ -1822,7 +1822,7 @@
           <a:p>
             <a:fld id="{932F90C7-F235-4F56-A8D8-8F315B19907E}" type="datetimeFigureOut">
               <a:rPr lang="da-DK" smtClean="0"/>
-              <a:t>13-10-2024</a:t>
+              <a:t>21-10-2024</a:t>
             </a:fld>
             <a:endParaRPr lang="da-DK"/>
           </a:p>
@@ -2097,7 +2097,7 @@
           <a:p>
             <a:fld id="{932F90C7-F235-4F56-A8D8-8F315B19907E}" type="datetimeFigureOut">
               <a:rPr lang="da-DK" smtClean="0"/>
-              <a:t>13-10-2024</a:t>
+              <a:t>21-10-2024</a:t>
             </a:fld>
             <a:endParaRPr lang="da-DK"/>
           </a:p>
@@ -2349,7 +2349,7 @@
           <a:p>
             <a:fld id="{932F90C7-F235-4F56-A8D8-8F315B19907E}" type="datetimeFigureOut">
               <a:rPr lang="da-DK" smtClean="0"/>
-              <a:t>13-10-2024</a:t>
+              <a:t>21-10-2024</a:t>
             </a:fld>
             <a:endParaRPr lang="da-DK"/>
           </a:p>
@@ -2560,7 +2560,7 @@
           <a:p>
             <a:fld id="{932F90C7-F235-4F56-A8D8-8F315B19907E}" type="datetimeFigureOut">
               <a:rPr lang="da-DK" smtClean="0"/>
-              <a:t>13-10-2024</a:t>
+              <a:t>21-10-2024</a:t>
             </a:fld>
             <a:endParaRPr lang="da-DK"/>
           </a:p>
@@ -4657,7 +4657,7 @@
         </p:nvSpPr>
         <p:spPr>
           <a:xfrm>
-            <a:off x="838200" y="0"/>
+            <a:off x="370840" y="-101600"/>
             <a:ext cx="10515600" cy="1325563"/>
           </a:xfrm>
         </p:spPr>
@@ -5080,6 +5080,72 @@
                 <a:hlinkClick r:id="rId3"/>
               </a:rPr>
               <a:t>https://www.w3schools.com/php/default.asp</a:t>
+            </a:r>
+            <a:endParaRPr lang="da-DK" sz="2000" u="sng" dirty="0">
+              <a:solidFill>
+                <a:srgbClr val="0563C1"/>
+              </a:solidFill>
+              <a:effectLst/>
+              <a:latin typeface="Calibri" panose="020F0502020204030204" pitchFamily="34" charset="0"/>
+              <a:ea typeface="Calibri" panose="020F0502020204030204" pitchFamily="34" charset="0"/>
+              <a:cs typeface="Times New Roman" panose="02020603050405020304" pitchFamily="18" charset="0"/>
+            </a:endParaRPr>
+          </a:p>
+          <a:p>
+            <a:pPr marL="0" indent="0">
+              <a:lnSpc>
+                <a:spcPct val="107000"/>
+              </a:lnSpc>
+              <a:spcAft>
+                <a:spcPts val="800"/>
+              </a:spcAft>
+              <a:buNone/>
+            </a:pPr>
+            <a:endParaRPr lang="da-DK" sz="2000" u="sng" dirty="0">
+              <a:solidFill>
+                <a:srgbClr val="0563C1"/>
+              </a:solidFill>
+              <a:latin typeface="Calibri" panose="020F0502020204030204" pitchFamily="34" charset="0"/>
+              <a:ea typeface="Calibri" panose="020F0502020204030204" pitchFamily="34" charset="0"/>
+              <a:cs typeface="Times New Roman" panose="02020603050405020304" pitchFamily="18" charset="0"/>
+            </a:endParaRPr>
+          </a:p>
+          <a:p>
+            <a:pPr marL="0" indent="0">
+              <a:lnSpc>
+                <a:spcPct val="107000"/>
+              </a:lnSpc>
+              <a:spcAft>
+                <a:spcPts val="800"/>
+              </a:spcAft>
+              <a:buNone/>
+            </a:pPr>
+            <a:r>
+              <a:rPr lang="da-DK" sz="2000" dirty="0" err="1">
+                <a:latin typeface="Calibri" panose="020F0502020204030204" pitchFamily="34" charset="0"/>
+                <a:ea typeface="Calibri" panose="020F0502020204030204" pitchFamily="34" charset="0"/>
+                <a:cs typeface="Times New Roman" panose="02020603050405020304" pitchFamily="18" charset="0"/>
+              </a:rPr>
+              <a:t>Tutorial</a:t>
+            </a:r>
+            <a:r>
+              <a:rPr lang="da-DK" sz="2000" dirty="0">
+                <a:latin typeface="Calibri" panose="020F0502020204030204" pitchFamily="34" charset="0"/>
+                <a:ea typeface="Calibri" panose="020F0502020204030204" pitchFamily="34" charset="0"/>
+                <a:cs typeface="Times New Roman" panose="02020603050405020304" pitchFamily="18" charset="0"/>
+              </a:rPr>
+              <a:t> til DB Browser: </a:t>
+            </a:r>
+            <a:r>
+              <a:rPr lang="da-DK" sz="2000" dirty="0">
+                <a:solidFill>
+                  <a:srgbClr val="0563C1"/>
+                </a:solidFill>
+                <a:latin typeface="Calibri" panose="020F0502020204030204" pitchFamily="34" charset="0"/>
+                <a:ea typeface="Calibri" panose="020F0502020204030204" pitchFamily="34" charset="0"/>
+                <a:cs typeface="Times New Roman" panose="02020603050405020304" pitchFamily="18" charset="0"/>
+              </a:rPr>
+              <a:t>https://www.youtube.com/watch?v=eJ-XmWbfeSg</a:t>
             </a:r>
             <a:endParaRPr lang="da-DK" sz="2000" dirty="0">
               <a:effectLst/>

</xml_diff>